<commit_message>
working on case study edits
</commit_message>
<xml_diff>
--- a/case-studies/jmMagallanes.pptx
+++ b/case-studies/jmMagallanes.pptx
@@ -3034,7 +3034,7 @@
         </p:nvSpPr>
         <p:spPr>
           <a:xfrm>
-            <a:off x="723263" y="2318028"/>
+            <a:off x="715550" y="2233128"/>
             <a:ext cx="11296941" cy="4265651"/>
           </a:xfrm>
           <a:prstGeom prst="roundRect">
@@ -4127,8 +4127,8 @@
         </p:nvSpPr>
         <p:spPr>
           <a:xfrm>
-            <a:off x="770712" y="4451731"/>
-            <a:ext cx="923544" cy="365760"/>
+            <a:off x="770712" y="4396248"/>
+            <a:ext cx="923544" cy="476726"/>
           </a:xfrm>
           <a:prstGeom prst="roundRect">
             <a:avLst/>
@@ -4173,8 +4173,8 @@
         </p:nvSpPr>
         <p:spPr>
           <a:xfrm>
-            <a:off x="1731114" y="4452507"/>
-            <a:ext cx="923544" cy="365760"/>
+            <a:off x="1731114" y="4397024"/>
+            <a:ext cx="923544" cy="476726"/>
           </a:xfrm>
           <a:prstGeom prst="roundRect">
             <a:avLst/>
@@ -4196,12 +4196,20 @@
           <a:p>
             <a:pPr algn="ctr"/>
             <a:r>
+              <a:rPr lang="en-US" sz="1100" b="1" smtClean="0">
+                <a:latin typeface="Helvetica" charset="0"/>
+                <a:ea typeface="Helvetica" charset="0"/>
+                <a:cs typeface="Helvetica" charset="0"/>
+              </a:rPr>
+              <a:t>Scraped </a:t>
+            </a:r>
+            <a:r>
               <a:rPr lang="en-US" sz="1100" b="1" dirty="0" smtClean="0">
                 <a:latin typeface="Helvetica" charset="0"/>
                 <a:ea typeface="Helvetica" charset="0"/>
                 <a:cs typeface="Helvetica" charset="0"/>
               </a:rPr>
-              <a:t>Scrapped Data sets</a:t>
+              <a:t>Data sets</a:t>
             </a:r>
             <a:endParaRPr lang="en-US" sz="1100" b="1" dirty="0">
               <a:latin typeface="Helvetica" charset="0"/>
@@ -4265,8 +4273,8 @@
         </p:nvSpPr>
         <p:spPr>
           <a:xfrm>
-            <a:off x="1735247" y="5174093"/>
-            <a:ext cx="927151" cy="365760"/>
+            <a:off x="1735247" y="5118610"/>
+            <a:ext cx="927151" cy="476726"/>
           </a:xfrm>
           <a:prstGeom prst="roundRect">
             <a:avLst/>
@@ -4293,7 +4301,7 @@
                 <a:ea typeface="Helvetica" charset="0"/>
                 <a:cs typeface="Helvetica" charset="0"/>
               </a:rPr>
-              <a:t>PYTHON Program</a:t>
+              <a:t>Python Program</a:t>
             </a:r>
             <a:endParaRPr lang="en-US" sz="1100" b="1" dirty="0">
               <a:latin typeface="Helvetica" charset="0"/>
@@ -4314,8 +4322,8 @@
         </p:nvCxnSpPr>
         <p:spPr>
           <a:xfrm>
-            <a:off x="2198823" y="5539853"/>
-            <a:ext cx="0" cy="355825"/>
+            <a:off x="2198823" y="5595336"/>
+            <a:ext cx="0" cy="300342"/>
           </a:xfrm>
           <a:prstGeom prst="straightConnector1">
             <a:avLst/>
@@ -4354,8 +4362,8 @@
         </p:nvCxnSpPr>
         <p:spPr>
           <a:xfrm flipH="1" flipV="1">
-            <a:off x="2192886" y="4818267"/>
-            <a:ext cx="5937" cy="355826"/>
+            <a:off x="2192886" y="4873750"/>
+            <a:ext cx="5937" cy="244860"/>
           </a:xfrm>
           <a:prstGeom prst="straightConnector1">
             <a:avLst/>
@@ -4651,15 +4659,7 @@
                 <a:ea typeface="Helvetica" charset="0"/>
                 <a:cs typeface="Helvetica" charset="0"/>
               </a:rPr>
-              <a:t> </a:t>
-            </a:r>
-            <a:r>
-              <a:rPr lang="en-US" sz="1100" b="1" dirty="0" smtClean="0">
-                <a:latin typeface="Helvetica" charset="0"/>
-                <a:ea typeface="Helvetica" charset="0"/>
-                <a:cs typeface="Helvetica" charset="0"/>
-              </a:rPr>
-              <a:t>Desktop</a:t>
+              <a:t> Desktop</a:t>
             </a:r>
             <a:endParaRPr lang="en-US" sz="1100" b="1" dirty="0">
               <a:latin typeface="Helvetica" charset="0"/>

</xml_diff>

<commit_message>
Fix typo in jmmag
</commit_message>
<xml_diff>
--- a/case-studies/jmMagallanes.pptx
+++ b/case-studies/jmMagallanes.pptx
@@ -254,7 +254,7 @@
           <a:p>
             <a:fld id="{44608ED9-4F79-D548-8E8D-C5D319F6A783}" type="datetimeFigureOut">
               <a:rPr lang="en-US" smtClean="0"/>
-              <a:t>10/5/16</a:t>
+              <a:t>10/6/16</a:t>
             </a:fld>
             <a:endParaRPr lang="en-US"/>
           </a:p>
@@ -424,7 +424,7 @@
           <a:p>
             <a:fld id="{44608ED9-4F79-D548-8E8D-C5D319F6A783}" type="datetimeFigureOut">
               <a:rPr lang="en-US" smtClean="0"/>
-              <a:t>10/5/16</a:t>
+              <a:t>10/6/16</a:t>
             </a:fld>
             <a:endParaRPr lang="en-US"/>
           </a:p>
@@ -604,7 +604,7 @@
           <a:p>
             <a:fld id="{44608ED9-4F79-D548-8E8D-C5D319F6A783}" type="datetimeFigureOut">
               <a:rPr lang="en-US" smtClean="0"/>
-              <a:t>10/5/16</a:t>
+              <a:t>10/6/16</a:t>
             </a:fld>
             <a:endParaRPr lang="en-US"/>
           </a:p>
@@ -774,7 +774,7 @@
           <a:p>
             <a:fld id="{44608ED9-4F79-D548-8E8D-C5D319F6A783}" type="datetimeFigureOut">
               <a:rPr lang="en-US" smtClean="0"/>
-              <a:t>10/5/16</a:t>
+              <a:t>10/6/16</a:t>
             </a:fld>
             <a:endParaRPr lang="en-US"/>
           </a:p>
@@ -1018,7 +1018,7 @@
           <a:p>
             <a:fld id="{44608ED9-4F79-D548-8E8D-C5D319F6A783}" type="datetimeFigureOut">
               <a:rPr lang="en-US" smtClean="0"/>
-              <a:t>10/5/16</a:t>
+              <a:t>10/6/16</a:t>
             </a:fld>
             <a:endParaRPr lang="en-US"/>
           </a:p>
@@ -1250,7 +1250,7 @@
           <a:p>
             <a:fld id="{44608ED9-4F79-D548-8E8D-C5D319F6A783}" type="datetimeFigureOut">
               <a:rPr lang="en-US" smtClean="0"/>
-              <a:t>10/5/16</a:t>
+              <a:t>10/6/16</a:t>
             </a:fld>
             <a:endParaRPr lang="en-US"/>
           </a:p>
@@ -1617,7 +1617,7 @@
           <a:p>
             <a:fld id="{44608ED9-4F79-D548-8E8D-C5D319F6A783}" type="datetimeFigureOut">
               <a:rPr lang="en-US" smtClean="0"/>
-              <a:t>10/5/16</a:t>
+              <a:t>10/6/16</a:t>
             </a:fld>
             <a:endParaRPr lang="en-US"/>
           </a:p>
@@ -1735,7 +1735,7 @@
           <a:p>
             <a:fld id="{44608ED9-4F79-D548-8E8D-C5D319F6A783}" type="datetimeFigureOut">
               <a:rPr lang="en-US" smtClean="0"/>
-              <a:t>10/5/16</a:t>
+              <a:t>10/6/16</a:t>
             </a:fld>
             <a:endParaRPr lang="en-US"/>
           </a:p>
@@ -1830,7 +1830,7 @@
           <a:p>
             <a:fld id="{44608ED9-4F79-D548-8E8D-C5D319F6A783}" type="datetimeFigureOut">
               <a:rPr lang="en-US" smtClean="0"/>
-              <a:t>10/5/16</a:t>
+              <a:t>10/6/16</a:t>
             </a:fld>
             <a:endParaRPr lang="en-US"/>
           </a:p>
@@ -2107,7 +2107,7 @@
           <a:p>
             <a:fld id="{44608ED9-4F79-D548-8E8D-C5D319F6A783}" type="datetimeFigureOut">
               <a:rPr lang="en-US" smtClean="0"/>
-              <a:t>10/5/16</a:t>
+              <a:t>10/6/16</a:t>
             </a:fld>
             <a:endParaRPr lang="en-US"/>
           </a:p>
@@ -2364,7 +2364,7 @@
           <a:p>
             <a:fld id="{44608ED9-4F79-D548-8E8D-C5D319F6A783}" type="datetimeFigureOut">
               <a:rPr lang="en-US" smtClean="0"/>
-              <a:t>10/5/16</a:t>
+              <a:t>10/6/16</a:t>
             </a:fld>
             <a:endParaRPr lang="en-US"/>
           </a:p>
@@ -2577,7 +2577,7 @@
           <a:p>
             <a:fld id="{44608ED9-4F79-D548-8E8D-C5D319F6A783}" type="datetimeFigureOut">
               <a:rPr lang="en-US" smtClean="0"/>
-              <a:t>10/5/16</a:t>
+              <a:t>10/6/16</a:t>
             </a:fld>
             <a:endParaRPr lang="en-US"/>
           </a:p>
@@ -3105,11 +3105,6 @@
               </a:rPr>
               <a:t>MANUAL STAGES</a:t>
             </a:r>
-            <a:endParaRPr lang="en-US" sz="1600" dirty="0">
-              <a:latin typeface="Helvetica" charset="0"/>
-              <a:ea typeface="Helvetica" charset="0"/>
-              <a:cs typeface="Helvetica" charset="0"/>
-            </a:endParaRPr>
           </a:p>
         </p:txBody>
       </p:sp>
@@ -3201,11 +3196,6 @@
               </a:rPr>
               <a:t>Define the Research Problem</a:t>
             </a:r>
-            <a:endParaRPr lang="en-US" sz="1600" dirty="0">
-              <a:latin typeface="Helvetica" charset="0"/>
-              <a:ea typeface="Helvetica" charset="0"/>
-              <a:cs typeface="Helvetica" charset="0"/>
-            </a:endParaRPr>
           </a:p>
         </p:txBody>
       </p:sp>
@@ -3245,11 +3235,6 @@
               </a:rPr>
               <a:t>Design the Research Plan</a:t>
             </a:r>
-            <a:endParaRPr lang="en-US" sz="1600" dirty="0">
-              <a:latin typeface="Helvetica" charset="0"/>
-              <a:ea typeface="Helvetica" charset="0"/>
-              <a:cs typeface="Helvetica" charset="0"/>
-            </a:endParaRPr>
           </a:p>
         </p:txBody>
       </p:sp>
@@ -3289,11 +3274,6 @@
               </a:rPr>
               <a:t>Review the Literature</a:t>
             </a:r>
-            <a:endParaRPr lang="en-US" sz="1600" dirty="0">
-              <a:latin typeface="Helvetica" charset="0"/>
-              <a:ea typeface="Helvetica" charset="0"/>
-              <a:cs typeface="Helvetica" charset="0"/>
-            </a:endParaRPr>
           </a:p>
         </p:txBody>
       </p:sp>
@@ -3333,11 +3313,6 @@
               </a:rPr>
               <a:t>Write the paper</a:t>
             </a:r>
-            <a:endParaRPr lang="en-US" sz="1600" dirty="0">
-              <a:latin typeface="Helvetica" charset="0"/>
-              <a:ea typeface="Helvetica" charset="0"/>
-              <a:cs typeface="Helvetica" charset="0"/>
-            </a:endParaRPr>
           </a:p>
         </p:txBody>
       </p:sp>
@@ -3600,11 +3575,6 @@
               </a:rPr>
               <a:t>Organize References</a:t>
             </a:r>
-            <a:endParaRPr lang="en-US" sz="1400" dirty="0">
-              <a:latin typeface="Helvetica" charset="0"/>
-              <a:ea typeface="Helvetica" charset="0"/>
-              <a:cs typeface="Helvetica" charset="0"/>
-            </a:endParaRPr>
           </a:p>
         </p:txBody>
       </p:sp>
@@ -3645,20 +3615,23 @@
               <a:t>Update </a:t>
             </a:r>
             <a:r>
-              <a:rPr lang="en-US" sz="1400" dirty="0" err="1" smtClean="0">
-                <a:latin typeface="Helvetica" charset="0"/>
-                <a:ea typeface="Helvetica" charset="0"/>
-                <a:cs typeface="Helvetica" charset="0"/>
-              </a:rPr>
-              <a:t>Computationand</a:t>
-            </a:r>
-            <a:r>
               <a:rPr lang="en-US" sz="1400" dirty="0" smtClean="0">
                 <a:latin typeface="Helvetica" charset="0"/>
                 <a:ea typeface="Helvetica" charset="0"/>
                 <a:cs typeface="Helvetica" charset="0"/>
               </a:rPr>
-              <a:t> </a:t>
+              <a:t>Computations</a:t>
+            </a:r>
+          </a:p>
+          <a:p>
+            <a:pPr algn="ctr"/>
+            <a:r>
+              <a:rPr lang="en-US" sz="1400" dirty="0" smtClean="0">
+                <a:latin typeface="Helvetica" charset="0"/>
+                <a:ea typeface="Helvetica" charset="0"/>
+                <a:cs typeface="Helvetica" charset="0"/>
+              </a:rPr>
+              <a:t>and </a:t>
             </a:r>
             <a:r>
               <a:rPr lang="en-US" sz="1400" dirty="0">
@@ -3668,11 +3641,6 @@
               </a:rPr>
               <a:t>plots</a:t>
             </a:r>
-            <a:endParaRPr lang="en-US" sz="1400" dirty="0">
-              <a:latin typeface="Helvetica" charset="0"/>
-              <a:ea typeface="Helvetica" charset="0"/>
-              <a:cs typeface="Helvetica" charset="0"/>
-            </a:endParaRPr>
           </a:p>
         </p:txBody>
       </p:sp>
@@ -3764,11 +3732,6 @@
               </a:rPr>
               <a:t>Organize archive</a:t>
             </a:r>
-            <a:endParaRPr lang="en-US" sz="1400" dirty="0">
-              <a:latin typeface="Helvetica" charset="0"/>
-              <a:ea typeface="Helvetica" charset="0"/>
-              <a:cs typeface="Helvetica" charset="0"/>
-            </a:endParaRPr>
           </a:p>
         </p:txBody>
       </p:sp>
@@ -4125,11 +4088,6 @@
               </a:rPr>
               <a:t>Web Data</a:t>
             </a:r>
-            <a:endParaRPr lang="en-US" sz="1400" dirty="0">
-              <a:latin typeface="Helvetica" charset="0"/>
-              <a:ea typeface="Helvetica" charset="0"/>
-              <a:cs typeface="Helvetica" charset="0"/>
-            </a:endParaRPr>
           </a:p>
         </p:txBody>
       </p:sp>
@@ -4171,11 +4129,6 @@
               </a:rPr>
               <a:t>Python Program</a:t>
             </a:r>
-            <a:endParaRPr lang="en-US" sz="1400" dirty="0">
-              <a:latin typeface="Helvetica" charset="0"/>
-              <a:ea typeface="Helvetica" charset="0"/>
-              <a:cs typeface="Helvetica" charset="0"/>
-            </a:endParaRPr>
           </a:p>
         </p:txBody>
       </p:sp>
@@ -4297,11 +4250,6 @@
               </a:rPr>
               <a:t>Integrated Data Set</a:t>
             </a:r>
-            <a:endParaRPr lang="en-US" sz="1400" dirty="0">
-              <a:latin typeface="Helvetica" charset="0"/>
-              <a:ea typeface="Helvetica" charset="0"/>
-              <a:cs typeface="Helvetica" charset="0"/>
-            </a:endParaRPr>
           </a:p>
         </p:txBody>
       </p:sp>
@@ -4435,11 +4383,6 @@
               </a:rPr>
               <a:t> Repo</a:t>
             </a:r>
-            <a:endParaRPr lang="en-US" sz="1400" dirty="0">
-              <a:latin typeface="Helvetica" charset="0"/>
-              <a:ea typeface="Helvetica" charset="0"/>
-              <a:cs typeface="Helvetica" charset="0"/>
-            </a:endParaRPr>
           </a:p>
         </p:txBody>
       </p:sp>
@@ -4481,11 +4424,6 @@
               </a:rPr>
               <a:t>Local Folder</a:t>
             </a:r>
-            <a:endParaRPr lang="en-US" sz="1400" dirty="0">
-              <a:latin typeface="Helvetica" charset="0"/>
-              <a:ea typeface="Helvetica" charset="0"/>
-              <a:cs typeface="Helvetica" charset="0"/>
-            </a:endParaRPr>
           </a:p>
         </p:txBody>
       </p:sp>
@@ -4535,11 +4473,6 @@
               </a:rPr>
               <a:t> Desktop</a:t>
             </a:r>
-            <a:endParaRPr lang="en-US" sz="1400" dirty="0">
-              <a:latin typeface="Helvetica" charset="0"/>
-              <a:ea typeface="Helvetica" charset="0"/>
-              <a:cs typeface="Helvetica" charset="0"/>
-            </a:endParaRPr>
           </a:p>
         </p:txBody>
       </p:sp>
@@ -4922,11 +4855,6 @@
               </a:rPr>
               <a:t>Bib File</a:t>
             </a:r>
-            <a:endParaRPr lang="en-US" sz="1400" dirty="0">
-              <a:latin typeface="Helvetica" charset="0"/>
-              <a:ea typeface="Helvetica" charset="0"/>
-              <a:cs typeface="Helvetica" charset="0"/>
-            </a:endParaRPr>
           </a:p>
         </p:txBody>
       </p:sp>
@@ -5100,11 +5028,6 @@
               </a:rPr>
               <a:t>Tables</a:t>
             </a:r>
-            <a:endParaRPr lang="en-US" sz="1400" dirty="0">
-              <a:latin typeface="Helvetica" charset="0"/>
-              <a:ea typeface="Helvetica" charset="0"/>
-              <a:cs typeface="Helvetica" charset="0"/>
-            </a:endParaRPr>
           </a:p>
         </p:txBody>
       </p:sp>
@@ -5146,11 +5069,6 @@
               </a:rPr>
               <a:t>Plots</a:t>
             </a:r>
-            <a:endParaRPr lang="en-US" sz="1400" dirty="0">
-              <a:latin typeface="Helvetica" charset="0"/>
-              <a:ea typeface="Helvetica" charset="0"/>
-              <a:cs typeface="Helvetica" charset="0"/>
-            </a:endParaRPr>
           </a:p>
         </p:txBody>
       </p:sp>
@@ -5645,10 +5563,6 @@
               </a:rPr>
               <a:t>Data Input, Processing</a:t>
             </a:r>
-            <a:endParaRPr lang="en-US" sz="2000" dirty="0">
-              <a:latin typeface="Helvetica"/>
-              <a:cs typeface="Helvetica"/>
-            </a:endParaRPr>
           </a:p>
         </p:txBody>
       </p:sp>
@@ -5690,10 +5604,6 @@
               </a:rPr>
               <a:t>Data Analysis</a:t>
             </a:r>
-            <a:endParaRPr lang="en-US" sz="2000" dirty="0">
-              <a:latin typeface="Helvetica"/>
-              <a:cs typeface="Helvetica"/>
-            </a:endParaRPr>
           </a:p>
         </p:txBody>
       </p:sp>

</xml_diff>